<commit_message>
Update figure_3.pptx and figure_3.pdf
</commit_message>
<xml_diff>
--- a/preprint/figures/figure_3.pptx
+++ b/preprint/figures/figure_3.pptx
@@ -254,7 +254,7 @@
           <a:p>
             <a:fld id="{956F7957-A3CA-4244-8E61-70E2801EA2CA}" type="datetimeFigureOut">
               <a:rPr lang="en-US" smtClean="0"/>
-              <a:t>11/29/22</a:t>
+              <a:t>12/6/22</a:t>
             </a:fld>
             <a:endParaRPr lang="en-US"/>
           </a:p>
@@ -424,7 +424,7 @@
           <a:p>
             <a:fld id="{956F7957-A3CA-4244-8E61-70E2801EA2CA}" type="datetimeFigureOut">
               <a:rPr lang="en-US" smtClean="0"/>
-              <a:t>11/29/22</a:t>
+              <a:t>12/6/22</a:t>
             </a:fld>
             <a:endParaRPr lang="en-US"/>
           </a:p>
@@ -604,7 +604,7 @@
           <a:p>
             <a:fld id="{956F7957-A3CA-4244-8E61-70E2801EA2CA}" type="datetimeFigureOut">
               <a:rPr lang="en-US" smtClean="0"/>
-              <a:t>11/29/22</a:t>
+              <a:t>12/6/22</a:t>
             </a:fld>
             <a:endParaRPr lang="en-US"/>
           </a:p>
@@ -774,7 +774,7 @@
           <a:p>
             <a:fld id="{956F7957-A3CA-4244-8E61-70E2801EA2CA}" type="datetimeFigureOut">
               <a:rPr lang="en-US" smtClean="0"/>
-              <a:t>11/29/22</a:t>
+              <a:t>12/6/22</a:t>
             </a:fld>
             <a:endParaRPr lang="en-US"/>
           </a:p>
@@ -1020,7 +1020,7 @@
           <a:p>
             <a:fld id="{956F7957-A3CA-4244-8E61-70E2801EA2CA}" type="datetimeFigureOut">
               <a:rPr lang="en-US" smtClean="0"/>
-              <a:t>11/29/22</a:t>
+              <a:t>12/6/22</a:t>
             </a:fld>
             <a:endParaRPr lang="en-US"/>
           </a:p>
@@ -1252,7 +1252,7 @@
           <a:p>
             <a:fld id="{956F7957-A3CA-4244-8E61-70E2801EA2CA}" type="datetimeFigureOut">
               <a:rPr lang="en-US" smtClean="0"/>
-              <a:t>11/29/22</a:t>
+              <a:t>12/6/22</a:t>
             </a:fld>
             <a:endParaRPr lang="en-US"/>
           </a:p>
@@ -1619,7 +1619,7 @@
           <a:p>
             <a:fld id="{956F7957-A3CA-4244-8E61-70E2801EA2CA}" type="datetimeFigureOut">
               <a:rPr lang="en-US" smtClean="0"/>
-              <a:t>11/29/22</a:t>
+              <a:t>12/6/22</a:t>
             </a:fld>
             <a:endParaRPr lang="en-US"/>
           </a:p>
@@ -1737,7 +1737,7 @@
           <a:p>
             <a:fld id="{956F7957-A3CA-4244-8E61-70E2801EA2CA}" type="datetimeFigureOut">
               <a:rPr lang="en-US" smtClean="0"/>
-              <a:t>11/29/22</a:t>
+              <a:t>12/6/22</a:t>
             </a:fld>
             <a:endParaRPr lang="en-US"/>
           </a:p>
@@ -1832,7 +1832,7 @@
           <a:p>
             <a:fld id="{956F7957-A3CA-4244-8E61-70E2801EA2CA}" type="datetimeFigureOut">
               <a:rPr lang="en-US" smtClean="0"/>
-              <a:t>11/29/22</a:t>
+              <a:t>12/6/22</a:t>
             </a:fld>
             <a:endParaRPr lang="en-US"/>
           </a:p>
@@ -2109,7 +2109,7 @@
           <a:p>
             <a:fld id="{956F7957-A3CA-4244-8E61-70E2801EA2CA}" type="datetimeFigureOut">
               <a:rPr lang="en-US" smtClean="0"/>
-              <a:t>11/29/22</a:t>
+              <a:t>12/6/22</a:t>
             </a:fld>
             <a:endParaRPr lang="en-US"/>
           </a:p>
@@ -2362,7 +2362,7 @@
           <a:p>
             <a:fld id="{956F7957-A3CA-4244-8E61-70E2801EA2CA}" type="datetimeFigureOut">
               <a:rPr lang="en-US" smtClean="0"/>
-              <a:t>11/29/22</a:t>
+              <a:t>12/6/22</a:t>
             </a:fld>
             <a:endParaRPr lang="en-US"/>
           </a:p>
@@ -2575,7 +2575,7 @@
           <a:p>
             <a:fld id="{956F7957-A3CA-4244-8E61-70E2801EA2CA}" type="datetimeFigureOut">
               <a:rPr lang="en-US" smtClean="0"/>
-              <a:t>11/29/22</a:t>
+              <a:t>12/6/22</a:t>
             </a:fld>
             <a:endParaRPr lang="en-US"/>
           </a:p>
@@ -2982,105 +2982,6 @@
       </p:grpSpPr>
       <p:sp>
         <p:nvSpPr>
-          <p:cNvPr id="43" name="Rechteck 42"/>
-          <p:cNvSpPr/>
-          <p:nvPr/>
-        </p:nvSpPr>
-        <p:spPr>
-          <a:xfrm>
-            <a:off x="1203649" y="5038588"/>
-            <a:ext cx="3336743" cy="1564438"/>
-          </a:xfrm>
-          <a:prstGeom prst="rect">
-            <a:avLst/>
-          </a:prstGeom>
-          <a:solidFill>
-            <a:schemeClr val="accent1">
-              <a:lumMod val="20000"/>
-              <a:lumOff val="80000"/>
-            </a:schemeClr>
-          </a:solidFill>
-          <a:ln>
-            <a:noFill/>
-          </a:ln>
-        </p:spPr>
-        <p:style>
-          <a:lnRef idx="2">
-            <a:schemeClr val="accent1">
-              <a:shade val="50000"/>
-            </a:schemeClr>
-          </a:lnRef>
-          <a:fillRef idx="1">
-            <a:schemeClr val="accent1"/>
-          </a:fillRef>
-          <a:effectRef idx="0">
-            <a:schemeClr val="accent1"/>
-          </a:effectRef>
-          <a:fontRef idx="minor">
-            <a:schemeClr val="lt1"/>
-          </a:fontRef>
-        </p:style>
-        <p:txBody>
-          <a:bodyPr rtlCol="0" anchor="ctr"/>
-          <a:lstStyle/>
-          <a:p>
-            <a:pPr algn="ctr"/>
-            <a:endParaRPr lang="en-US"/>
-          </a:p>
-        </p:txBody>
-      </p:sp>
-      <p:sp>
-        <p:nvSpPr>
-          <p:cNvPr id="32" name="Rechteck 31"/>
-          <p:cNvSpPr/>
-          <p:nvPr/>
-        </p:nvSpPr>
-        <p:spPr>
-          <a:xfrm>
-            <a:off x="2472612" y="877079"/>
-            <a:ext cx="7091266" cy="3974840"/>
-          </a:xfrm>
-          <a:prstGeom prst="rect">
-            <a:avLst/>
-          </a:prstGeom>
-          <a:solidFill>
-            <a:schemeClr val="accent1">
-              <a:lumMod val="20000"/>
-              <a:lumOff val="80000"/>
-            </a:schemeClr>
-          </a:solidFill>
-          <a:ln>
-            <a:noFill/>
-            <a:prstDash val="solid"/>
-          </a:ln>
-        </p:spPr>
-        <p:style>
-          <a:lnRef idx="2">
-            <a:schemeClr val="accent1">
-              <a:shade val="50000"/>
-            </a:schemeClr>
-          </a:lnRef>
-          <a:fillRef idx="1">
-            <a:schemeClr val="accent1"/>
-          </a:fillRef>
-          <a:effectRef idx="0">
-            <a:schemeClr val="accent1"/>
-          </a:effectRef>
-          <a:fontRef idx="minor">
-            <a:schemeClr val="lt1"/>
-          </a:fontRef>
-        </p:style>
-        <p:txBody>
-          <a:bodyPr rtlCol="0" anchor="ctr"/>
-          <a:lstStyle/>
-          <a:p>
-            <a:pPr algn="ctr"/>
-            <a:endParaRPr lang="en-US"/>
-          </a:p>
-        </p:txBody>
-      </p:sp>
-      <p:sp>
-        <p:nvSpPr>
           <p:cNvPr id="2" name="Textfeld 1"/>
           <p:cNvSpPr txBox="1"/>
           <p:nvPr/>
@@ -3589,146 +3490,6 @@
           <a:xfrm flipH="1">
             <a:off x="4111953" y="2176855"/>
             <a:ext cx="1870971" cy="366320"/>
-          </a:xfrm>
-          <a:prstGeom prst="straightConnector1">
-            <a:avLst/>
-          </a:prstGeom>
-          <a:ln w="38100">
-            <a:solidFill>
-              <a:schemeClr val="tx1"/>
-            </a:solidFill>
-            <a:tailEnd type="triangle"/>
-          </a:ln>
-        </p:spPr>
-        <p:style>
-          <a:lnRef idx="1">
-            <a:schemeClr val="accent1"/>
-          </a:lnRef>
-          <a:fillRef idx="0">
-            <a:schemeClr val="accent1"/>
-          </a:fillRef>
-          <a:effectRef idx="0">
-            <a:schemeClr val="accent1"/>
-          </a:effectRef>
-          <a:fontRef idx="minor">
-            <a:schemeClr val="tx1"/>
-          </a:fontRef>
-        </p:style>
-      </p:cxnSp>
-      <p:sp>
-        <p:nvSpPr>
-          <p:cNvPr id="33" name="Textfeld 32"/>
-          <p:cNvSpPr txBox="1"/>
-          <p:nvPr/>
-        </p:nvSpPr>
-        <p:spPr>
-          <a:xfrm>
-            <a:off x="2472612" y="889416"/>
-            <a:ext cx="2822183" cy="369332"/>
-          </a:xfrm>
-          <a:prstGeom prst="rect">
-            <a:avLst/>
-          </a:prstGeom>
-          <a:noFill/>
-        </p:spPr>
-        <p:txBody>
-          <a:bodyPr wrap="none" rtlCol="0">
-            <a:spAutoFit/>
-          </a:bodyPr>
-          <a:lstStyle/>
-          <a:p>
-            <a:r>
-              <a:rPr lang="en-US" b="1" dirty="0"/>
-              <a:t>Within-Subjects Treatments</a:t>
-            </a:r>
-          </a:p>
-        </p:txBody>
-      </p:sp>
-      <p:sp>
-        <p:nvSpPr>
-          <p:cNvPr id="35" name="Textfeld 34"/>
-          <p:cNvSpPr txBox="1"/>
-          <p:nvPr/>
-        </p:nvSpPr>
-        <p:spPr>
-          <a:xfrm>
-            <a:off x="1203649" y="5038588"/>
-            <a:ext cx="3020763" cy="369332"/>
-          </a:xfrm>
-          <a:prstGeom prst="rect">
-            <a:avLst/>
-          </a:prstGeom>
-          <a:noFill/>
-        </p:spPr>
-        <p:txBody>
-          <a:bodyPr wrap="none" rtlCol="0">
-            <a:spAutoFit/>
-          </a:bodyPr>
-          <a:lstStyle/>
-          <a:p>
-            <a:r>
-              <a:rPr lang="en-US" b="1" dirty="0"/>
-              <a:t>Between-Subjects Treatments</a:t>
-            </a:r>
-          </a:p>
-        </p:txBody>
-      </p:sp>
-      <p:sp>
-        <p:nvSpPr>
-          <p:cNvPr id="38" name="Textfeld 37"/>
-          <p:cNvSpPr txBox="1"/>
-          <p:nvPr/>
-        </p:nvSpPr>
-        <p:spPr>
-          <a:xfrm>
-            <a:off x="1573886" y="5633529"/>
-            <a:ext cx="2540567" cy="646331"/>
-          </a:xfrm>
-          <a:prstGeom prst="rect">
-            <a:avLst/>
-          </a:prstGeom>
-          <a:solidFill>
-            <a:schemeClr val="bg1"/>
-          </a:solidFill>
-          <a:ln>
-            <a:solidFill>
-              <a:schemeClr val="tx1"/>
-            </a:solidFill>
-          </a:ln>
-        </p:spPr>
-        <p:txBody>
-          <a:bodyPr wrap="none" rtlCol="0">
-            <a:spAutoFit/>
-          </a:bodyPr>
-          <a:lstStyle/>
-          <a:p>
-            <a:pPr algn="ctr"/>
-            <a:r>
-              <a:rPr lang="en-US" dirty="0"/>
-              <a:t>2 Formulations</a:t>
-            </a:r>
-          </a:p>
-          <a:p>
-            <a:pPr algn="ctr"/>
-            <a:r>
-              <a:rPr lang="en-US" dirty="0"/>
-              <a:t>(Avoidance, Enablement)</a:t>
-            </a:r>
-          </a:p>
-        </p:txBody>
-      </p:sp>
-      <p:cxnSp>
-        <p:nvCxnSpPr>
-          <p:cNvPr id="40" name="Gerade Verbindung mit Pfeil 39"/>
-          <p:cNvCxnSpPr>
-            <a:cxnSpLocks/>
-          </p:cNvCxnSpPr>
-          <p:nvPr/>
-        </p:nvCxnSpPr>
-        <p:spPr>
-          <a:xfrm>
-            <a:off x="4137025" y="5956695"/>
-            <a:ext cx="796925" cy="0"/>
           </a:xfrm>
           <a:prstGeom prst="straightConnector1">
             <a:avLst/>

</xml_diff>